<commit_message>
Added bullet points to integration test slides
</commit_message>
<xml_diff>
--- a/docs/SE420_Sverdrup_Leffler_DiPinto_Velarde.pptx
+++ b/docs/SE420_Sverdrup_Leffler_DiPinto_Velarde.pptx
@@ -6185,7 +6185,7 @@
         <p:spPr>
           <a:xfrm>
             <a:off x="241637" y="285749"/>
-            <a:ext cx="7745076" cy="5335089"/>
+            <a:ext cx="6637283" cy="4572001"/>
           </a:xfrm>
         </p:spPr>
       </p:pic>
@@ -6264,7 +6264,7 @@
         </p:blipFill>
         <p:spPr>
           <a:xfrm>
-            <a:off x="5029200" y="3669450"/>
+            <a:off x="241637" y="5018990"/>
             <a:ext cx="6834187" cy="559650"/>
           </a:xfrm>
           <a:prstGeom prst="rect">
@@ -6277,6 +6277,60 @@
           </a:ln>
         </p:spPr>
       </p:pic>
+      <p:sp>
+        <p:nvSpPr>
+          <p:cNvPr id="3" name="TextBox 2"/>
+          <p:cNvSpPr txBox="1"/>
+          <p:nvPr/>
+        </p:nvSpPr>
+        <p:spPr>
+          <a:xfrm>
+            <a:off x="6878920" y="3137877"/>
+            <a:ext cx="5153525" cy="1200329"/>
+          </a:xfrm>
+          <a:prstGeom prst="rect">
+            <a:avLst/>
+          </a:prstGeom>
+          <a:noFill/>
+        </p:spPr>
+        <p:txBody>
+          <a:bodyPr wrap="square" rtlCol="0">
+            <a:spAutoFit/>
+          </a:bodyPr>
+          <a:lstStyle/>
+          <a:p>
+            <a:pPr marL="285750" indent="-285750">
+              <a:buFont typeface="Arial" charset="0"/>
+              <a:buChar char="•"/>
+            </a:pPr>
+            <a:r>
+              <a:rPr lang="en-US" dirty="0" smtClean="0"/>
+              <a:t>Examine behavior of integrated modules</a:t>
+            </a:r>
+          </a:p>
+          <a:p>
+            <a:pPr marL="285750" indent="-285750">
+              <a:buFont typeface="Arial" charset="0"/>
+              <a:buChar char="•"/>
+            </a:pPr>
+            <a:r>
+              <a:rPr lang="en-US" dirty="0" smtClean="0"/>
+              <a:t>Perform fault injection</a:t>
+            </a:r>
+          </a:p>
+          <a:p>
+            <a:pPr marL="285750" indent="-285750">
+              <a:buFont typeface="Arial" charset="0"/>
+              <a:buChar char="•"/>
+            </a:pPr>
+            <a:r>
+              <a:rPr lang="en-US" dirty="0" smtClean="0"/>
+              <a:t>Increase code coverage not covered during unit tests</a:t>
+            </a:r>
+            <a:endParaRPr lang="en-US" dirty="0"/>
+          </a:p>
+        </p:txBody>
+      </p:sp>
     </p:spTree>
     <p:extLst>
       <p:ext uri="{BB962C8B-B14F-4D97-AF65-F5344CB8AC3E}">

</xml_diff>